<commit_message>
Example E4 +struggling on slicing useContext
Two profiles slice useContext:
LabServiceDefinition
LabChargeItemDefinition
</commit_message>
<xml_diff>
--- a/input/images-source/LabExampleE4Technical.pptx
+++ b/input/images-source/LabExampleE4Technical.pptx
@@ -197,7 +197,7 @@
           <a:p>
             <a:fld id="{567555BC-1E79-452F-9C1B-714B0951F390}" type="datetimeFigureOut">
               <a:rPr lang="fr-FR" smtClean="0"/>
-              <a:t>12/02/2020</a:t>
+              <a:t>13/02/2020</a:t>
             </a:fld>
             <a:endParaRPr lang="fr-FR"/>
           </a:p>
@@ -695,7 +695,7 @@
           <a:p>
             <a:fld id="{8BCF6F66-F8B5-42A7-8BF1-80240DF56CB0}" type="datetimeFigureOut">
               <a:rPr lang="fr-FR" smtClean="0"/>
-              <a:t>12/02/2020</a:t>
+              <a:t>13/02/2020</a:t>
             </a:fld>
             <a:endParaRPr lang="fr-FR"/>
           </a:p>
@@ -893,7 +893,7 @@
           <a:p>
             <a:fld id="{8BCF6F66-F8B5-42A7-8BF1-80240DF56CB0}" type="datetimeFigureOut">
               <a:rPr lang="fr-FR" smtClean="0"/>
-              <a:t>12/02/2020</a:t>
+              <a:t>13/02/2020</a:t>
             </a:fld>
             <a:endParaRPr lang="fr-FR"/>
           </a:p>
@@ -1101,7 +1101,7 @@
           <a:p>
             <a:fld id="{8BCF6F66-F8B5-42A7-8BF1-80240DF56CB0}" type="datetimeFigureOut">
               <a:rPr lang="fr-FR" smtClean="0"/>
-              <a:t>12/02/2020</a:t>
+              <a:t>13/02/2020</a:t>
             </a:fld>
             <a:endParaRPr lang="fr-FR"/>
           </a:p>
@@ -1299,7 +1299,7 @@
           <a:p>
             <a:fld id="{8BCF6F66-F8B5-42A7-8BF1-80240DF56CB0}" type="datetimeFigureOut">
               <a:rPr lang="fr-FR" smtClean="0"/>
-              <a:t>12/02/2020</a:t>
+              <a:t>13/02/2020</a:t>
             </a:fld>
             <a:endParaRPr lang="fr-FR"/>
           </a:p>
@@ -1574,7 +1574,7 @@
           <a:p>
             <a:fld id="{8BCF6F66-F8B5-42A7-8BF1-80240DF56CB0}" type="datetimeFigureOut">
               <a:rPr lang="fr-FR" smtClean="0"/>
-              <a:t>12/02/2020</a:t>
+              <a:t>13/02/2020</a:t>
             </a:fld>
             <a:endParaRPr lang="fr-FR"/>
           </a:p>
@@ -1839,7 +1839,7 @@
           <a:p>
             <a:fld id="{8BCF6F66-F8B5-42A7-8BF1-80240DF56CB0}" type="datetimeFigureOut">
               <a:rPr lang="fr-FR" smtClean="0"/>
-              <a:t>12/02/2020</a:t>
+              <a:t>13/02/2020</a:t>
             </a:fld>
             <a:endParaRPr lang="fr-FR"/>
           </a:p>
@@ -2251,7 +2251,7 @@
           <a:p>
             <a:fld id="{8BCF6F66-F8B5-42A7-8BF1-80240DF56CB0}" type="datetimeFigureOut">
               <a:rPr lang="fr-FR" smtClean="0"/>
-              <a:t>12/02/2020</a:t>
+              <a:t>13/02/2020</a:t>
             </a:fld>
             <a:endParaRPr lang="fr-FR"/>
           </a:p>
@@ -2392,7 +2392,7 @@
           <a:p>
             <a:fld id="{8BCF6F66-F8B5-42A7-8BF1-80240DF56CB0}" type="datetimeFigureOut">
               <a:rPr lang="fr-FR" smtClean="0"/>
-              <a:t>12/02/2020</a:t>
+              <a:t>13/02/2020</a:t>
             </a:fld>
             <a:endParaRPr lang="fr-FR"/>
           </a:p>
@@ -2505,7 +2505,7 @@
           <a:p>
             <a:fld id="{8BCF6F66-F8B5-42A7-8BF1-80240DF56CB0}" type="datetimeFigureOut">
               <a:rPr lang="fr-FR" smtClean="0"/>
-              <a:t>12/02/2020</a:t>
+              <a:t>13/02/2020</a:t>
             </a:fld>
             <a:endParaRPr lang="fr-FR"/>
           </a:p>
@@ -2816,7 +2816,7 @@
           <a:p>
             <a:fld id="{8BCF6F66-F8B5-42A7-8BF1-80240DF56CB0}" type="datetimeFigureOut">
               <a:rPr lang="fr-FR" smtClean="0"/>
-              <a:t>12/02/2020</a:t>
+              <a:t>13/02/2020</a:t>
             </a:fld>
             <a:endParaRPr lang="fr-FR"/>
           </a:p>
@@ -3104,7 +3104,7 @@
           <a:p>
             <a:fld id="{8BCF6F66-F8B5-42A7-8BF1-80240DF56CB0}" type="datetimeFigureOut">
               <a:rPr lang="fr-FR" smtClean="0"/>
-              <a:t>12/02/2020</a:t>
+              <a:t>13/02/2020</a:t>
             </a:fld>
             <a:endParaRPr lang="fr-FR"/>
           </a:p>
@@ -3345,7 +3345,7 @@
           <a:p>
             <a:fld id="{8BCF6F66-F8B5-42A7-8BF1-80240DF56CB0}" type="datetimeFigureOut">
               <a:rPr lang="fr-FR" smtClean="0"/>
-              <a:t>12/02/2020</a:t>
+              <a:t>13/02/2020</a:t>
             </a:fld>
             <a:endParaRPr lang="fr-FR"/>
           </a:p>
@@ -4245,8 +4245,8 @@
         </p:nvCxnSpPr>
         <p:spPr>
           <a:xfrm flipV="1">
-            <a:off x="5047861" y="2960690"/>
-            <a:ext cx="1253880" cy="1531258"/>
+            <a:off x="4974579" y="2960690"/>
+            <a:ext cx="1327162" cy="3038394"/>
           </a:xfrm>
           <a:prstGeom prst="straightConnector1">
             <a:avLst/>
@@ -4333,7 +4333,7 @@
         <p:spPr>
           <a:xfrm>
             <a:off x="2521705" y="833092"/>
-            <a:ext cx="3582289" cy="4354719"/>
+            <a:ext cx="3582289" cy="5834585"/>
           </a:xfrm>
           <a:prstGeom prst="roundRect">
             <a:avLst>
@@ -4517,16 +4517,146 @@
                   <a:srgbClr val="FFFF00"/>
                 </a:highlight>
               </a:rPr>
-              <a:t>useContext {code: task, value: LABOE</a:t>
-            </a:r>
+              <a:t>useContext</a:t>
+            </a:r>
+          </a:p>
+          <a:p>
+            <a:pPr marL="265113"/>
             <a:r>
               <a:rPr lang="en-US" sz="1600" noProof="1">
                 <a:solidFill>
                   <a:srgbClr val="0070C0"/>
                 </a:solidFill>
-              </a:rPr>
-              <a:t>}</a:t>
-            </a:r>
+                <a:highlight>
+                  <a:srgbClr val="FFFF00"/>
+                </a:highlight>
+              </a:rPr>
+              <a:t>code: </a:t>
+            </a:r>
+            <a:r>
+              <a:rPr lang="en-US" sz="1600" noProof="1">
+                <a:solidFill>
+                  <a:schemeClr val="tx1"/>
+                </a:solidFill>
+                <a:highlight>
+                  <a:srgbClr val="FFFF00"/>
+                </a:highlight>
+              </a:rPr>
+              <a:t>task</a:t>
+            </a:r>
+          </a:p>
+          <a:p>
+            <a:pPr marL="265113"/>
+            <a:r>
+              <a:rPr lang="en-US" sz="1600" noProof="1">
+                <a:solidFill>
+                  <a:srgbClr val="0070C0"/>
+                </a:solidFill>
+                <a:highlight>
+                  <a:srgbClr val="FFFF00"/>
+                </a:highlight>
+              </a:rPr>
+              <a:t>valueCodeableConcept</a:t>
+            </a:r>
+          </a:p>
+          <a:p>
+            <a:pPr marL="452438"/>
+            <a:r>
+              <a:rPr lang="en-US" sz="1600" noProof="1">
+                <a:solidFill>
+                  <a:srgbClr val="0070C0"/>
+                </a:solidFill>
+                <a:highlight>
+                  <a:srgbClr val="FFFF00"/>
+                </a:highlight>
+              </a:rPr>
+              <a:t>system: </a:t>
+            </a:r>
+            <a:r>
+              <a:rPr lang="en-US" sz="1600" noProof="1">
+                <a:solidFill>
+                  <a:schemeClr val="tx1"/>
+                </a:solidFill>
+                <a:highlight>
+                  <a:srgbClr val="FFFF00"/>
+                </a:highlight>
+              </a:rPr>
+              <a:t>v3-ActCode</a:t>
+            </a:r>
+            <a:endParaRPr lang="en-US" sz="1600" noProof="1">
+              <a:solidFill>
+                <a:srgbClr val="0070C0"/>
+              </a:solidFill>
+              <a:highlight>
+                <a:srgbClr val="FFFF00"/>
+              </a:highlight>
+            </a:endParaRPr>
+          </a:p>
+          <a:p>
+            <a:pPr marL="452438"/>
+            <a:r>
+              <a:rPr lang="en-US" sz="1600" noProof="1">
+                <a:solidFill>
+                  <a:srgbClr val="0070C0"/>
+                </a:solidFill>
+                <a:highlight>
+                  <a:srgbClr val="FFFF00"/>
+                </a:highlight>
+              </a:rPr>
+              <a:t>code</a:t>
+            </a:r>
+            <a:r>
+              <a:rPr lang="en-US" sz="1600" noProof="1">
+                <a:solidFill>
+                  <a:schemeClr val="tx1"/>
+                </a:solidFill>
+                <a:highlight>
+                  <a:srgbClr val="FFFF00"/>
+                </a:highlight>
+              </a:rPr>
+              <a:t>: LABOE</a:t>
+            </a:r>
+          </a:p>
+          <a:p>
+            <a:pPr marL="452438"/>
+            <a:r>
+              <a:rPr lang="en-US" sz="1600" noProof="1">
+                <a:solidFill>
+                  <a:srgbClr val="0070C0"/>
+                </a:solidFill>
+                <a:highlight>
+                  <a:srgbClr val="FFFF00"/>
+                </a:highlight>
+              </a:rPr>
+              <a:t>display: </a:t>
+            </a:r>
+            <a:r>
+              <a:rPr lang="en-US" sz="1600" noProof="1">
+                <a:solidFill>
+                  <a:schemeClr val="tx1"/>
+                </a:solidFill>
+                <a:highlight>
+                  <a:srgbClr val="FFFF00"/>
+                </a:highlight>
+              </a:rPr>
+              <a:t>lab order entry</a:t>
+            </a:r>
+            <a:endParaRPr lang="en-US" sz="1600" noProof="1">
+              <a:solidFill>
+                <a:srgbClr val="0070C0"/>
+              </a:solidFill>
+              <a:highlight>
+                <a:srgbClr val="FFFF00"/>
+              </a:highlight>
+            </a:endParaRPr>
+          </a:p>
+          <a:p>
+            <a:pPr marL="176213"/>
+            <a:endParaRPr lang="en-US" sz="1600" noProof="1">
+              <a:solidFill>
+                <a:srgbClr val="0070C0"/>
+              </a:solidFill>
+            </a:endParaRPr>
           </a:p>
           <a:p>
             <a:pPr marL="176213"/>
@@ -5067,9 +5197,9 @@
           <p:nvPr/>
         </p:nvCxnSpPr>
         <p:spPr>
-          <a:xfrm>
-            <a:off x="4963886" y="5008230"/>
-            <a:ext cx="1327162" cy="455220"/>
+          <a:xfrm flipV="1">
+            <a:off x="4963886" y="5463450"/>
+            <a:ext cx="1327162" cy="993334"/>
           </a:xfrm>
           <a:prstGeom prst="straightConnector1">
             <a:avLst/>
@@ -5110,7 +5240,7 @@
         </p:nvSpPr>
         <p:spPr>
           <a:xfrm>
-            <a:off x="1879718" y="3708798"/>
+            <a:off x="1879718" y="5164371"/>
             <a:ext cx="324464" cy="1361069"/>
           </a:xfrm>
           <a:prstGeom prst="leftBrace">
@@ -5164,8 +5294,8 @@
         </p:nvSpPr>
         <p:spPr>
           <a:xfrm>
-            <a:off x="1306132" y="4031228"/>
-            <a:ext cx="796413" cy="646331"/>
+            <a:off x="490743" y="5410051"/>
+            <a:ext cx="1486725" cy="923330"/>
           </a:xfrm>
           <a:prstGeom prst="rect">
             <a:avLst/>
@@ -5186,7 +5316,19 @@
                   </a:schemeClr>
                 </a:solidFill>
               </a:rPr>
-              <a:t>Group XOR</a:t>
+              <a:t>Group exclusive OR</a:t>
+            </a:r>
+          </a:p>
+          <a:p>
+            <a:r>
+              <a:rPr lang="en-US" noProof="1">
+                <a:solidFill>
+                  <a:schemeClr val="accent2">
+                    <a:lumMod val="50000"/>
+                  </a:schemeClr>
+                </a:solidFill>
+              </a:rPr>
+              <a:t>(XOR)</a:t>
             </a:r>
           </a:p>
         </p:txBody>
@@ -5207,7 +5349,7 @@
         </p:nvCxnSpPr>
         <p:spPr>
           <a:xfrm>
-            <a:off x="2288748" y="3708798"/>
+            <a:off x="2288748" y="5164371"/>
             <a:ext cx="755855" cy="0"/>
           </a:xfrm>
           <a:prstGeom prst="line">
@@ -5253,7 +5395,7 @@
         </p:nvCxnSpPr>
         <p:spPr>
           <a:xfrm>
-            <a:off x="2266625" y="5069867"/>
+            <a:off x="2266625" y="6525440"/>
             <a:ext cx="755855" cy="0"/>
           </a:xfrm>
           <a:prstGeom prst="line">

</xml_diff>

<commit_message>
Example figures corrected to apply the new method for specimen requirements
</commit_message>
<xml_diff>
--- a/input/images-source/LabExampleE4Technical.pptx
+++ b/input/images-source/LabExampleE4Technical.pptx
@@ -197,7 +197,7 @@
           <a:p>
             <a:fld id="{567555BC-1E79-452F-9C1B-714B0951F390}" type="datetimeFigureOut">
               <a:rPr lang="fr-FR" smtClean="0"/>
-              <a:t>08/06/2020</a:t>
+              <a:t>09/06/2020</a:t>
             </a:fld>
             <a:endParaRPr lang="fr-FR"/>
           </a:p>
@@ -695,7 +695,7 @@
           <a:p>
             <a:fld id="{8BCF6F66-F8B5-42A7-8BF1-80240DF56CB0}" type="datetimeFigureOut">
               <a:rPr lang="fr-FR" smtClean="0"/>
-              <a:t>08/06/2020</a:t>
+              <a:t>09/06/2020</a:t>
             </a:fld>
             <a:endParaRPr lang="fr-FR"/>
           </a:p>
@@ -893,7 +893,7 @@
           <a:p>
             <a:fld id="{8BCF6F66-F8B5-42A7-8BF1-80240DF56CB0}" type="datetimeFigureOut">
               <a:rPr lang="fr-FR" smtClean="0"/>
-              <a:t>08/06/2020</a:t>
+              <a:t>09/06/2020</a:t>
             </a:fld>
             <a:endParaRPr lang="fr-FR"/>
           </a:p>
@@ -1101,7 +1101,7 @@
           <a:p>
             <a:fld id="{8BCF6F66-F8B5-42A7-8BF1-80240DF56CB0}" type="datetimeFigureOut">
               <a:rPr lang="fr-FR" smtClean="0"/>
-              <a:t>08/06/2020</a:t>
+              <a:t>09/06/2020</a:t>
             </a:fld>
             <a:endParaRPr lang="fr-FR"/>
           </a:p>
@@ -1299,7 +1299,7 @@
           <a:p>
             <a:fld id="{8BCF6F66-F8B5-42A7-8BF1-80240DF56CB0}" type="datetimeFigureOut">
               <a:rPr lang="fr-FR" smtClean="0"/>
-              <a:t>08/06/2020</a:t>
+              <a:t>09/06/2020</a:t>
             </a:fld>
             <a:endParaRPr lang="fr-FR"/>
           </a:p>
@@ -1574,7 +1574,7 @@
           <a:p>
             <a:fld id="{8BCF6F66-F8B5-42A7-8BF1-80240DF56CB0}" type="datetimeFigureOut">
               <a:rPr lang="fr-FR" smtClean="0"/>
-              <a:t>08/06/2020</a:t>
+              <a:t>09/06/2020</a:t>
             </a:fld>
             <a:endParaRPr lang="fr-FR"/>
           </a:p>
@@ -1839,7 +1839,7 @@
           <a:p>
             <a:fld id="{8BCF6F66-F8B5-42A7-8BF1-80240DF56CB0}" type="datetimeFigureOut">
               <a:rPr lang="fr-FR" smtClean="0"/>
-              <a:t>08/06/2020</a:t>
+              <a:t>09/06/2020</a:t>
             </a:fld>
             <a:endParaRPr lang="fr-FR"/>
           </a:p>
@@ -2251,7 +2251,7 @@
           <a:p>
             <a:fld id="{8BCF6F66-F8B5-42A7-8BF1-80240DF56CB0}" type="datetimeFigureOut">
               <a:rPr lang="fr-FR" smtClean="0"/>
-              <a:t>08/06/2020</a:t>
+              <a:t>09/06/2020</a:t>
             </a:fld>
             <a:endParaRPr lang="fr-FR"/>
           </a:p>
@@ -2392,7 +2392,7 @@
           <a:p>
             <a:fld id="{8BCF6F66-F8B5-42A7-8BF1-80240DF56CB0}" type="datetimeFigureOut">
               <a:rPr lang="fr-FR" smtClean="0"/>
-              <a:t>08/06/2020</a:t>
+              <a:t>09/06/2020</a:t>
             </a:fld>
             <a:endParaRPr lang="fr-FR"/>
           </a:p>
@@ -2505,7 +2505,7 @@
           <a:p>
             <a:fld id="{8BCF6F66-F8B5-42A7-8BF1-80240DF56CB0}" type="datetimeFigureOut">
               <a:rPr lang="fr-FR" smtClean="0"/>
-              <a:t>08/06/2020</a:t>
+              <a:t>09/06/2020</a:t>
             </a:fld>
             <a:endParaRPr lang="fr-FR"/>
           </a:p>
@@ -2816,7 +2816,7 @@
           <a:p>
             <a:fld id="{8BCF6F66-F8B5-42A7-8BF1-80240DF56CB0}" type="datetimeFigureOut">
               <a:rPr lang="fr-FR" smtClean="0"/>
-              <a:t>08/06/2020</a:t>
+              <a:t>09/06/2020</a:t>
             </a:fld>
             <a:endParaRPr lang="fr-FR"/>
           </a:p>
@@ -3104,7 +3104,7 @@
           <a:p>
             <a:fld id="{8BCF6F66-F8B5-42A7-8BF1-80240DF56CB0}" type="datetimeFigureOut">
               <a:rPr lang="fr-FR" smtClean="0"/>
-              <a:t>08/06/2020</a:t>
+              <a:t>09/06/2020</a:t>
             </a:fld>
             <a:endParaRPr lang="fr-FR"/>
           </a:p>
@@ -3345,7 +3345,7 @@
           <a:p>
             <a:fld id="{8BCF6F66-F8B5-42A7-8BF1-80240DF56CB0}" type="datetimeFigureOut">
               <a:rPr lang="fr-FR" smtClean="0"/>
-              <a:t>08/06/2020</a:t>
+              <a:t>09/06/2020</a:t>
             </a:fld>
             <a:endParaRPr lang="fr-FR"/>
           </a:p>
@@ -3764,10 +3764,10 @@
       </p:grpSpPr>
       <p:sp>
         <p:nvSpPr>
-          <p:cNvPr id="23" name="Rectangle : coins arrondis 22">
-            <a:extLst>
-              <a:ext uri="{FF2B5EF4-FFF2-40B4-BE49-F238E27FC236}">
-                <a16:creationId xmlns:a16="http://schemas.microsoft.com/office/drawing/2014/main" id="{8CF8298D-D2FD-40AB-A874-0128D23338E0}"/>
+          <p:cNvPr id="14" name="Rectangle : coins arrondis 13">
+            <a:extLst>
+              <a:ext uri="{FF2B5EF4-FFF2-40B4-BE49-F238E27FC236}">
+                <a16:creationId xmlns:a16="http://schemas.microsoft.com/office/drawing/2014/main" id="{29FD789E-5DC2-4F77-8D9C-05567FD55A8C}"/>
               </a:ext>
             </a:extLst>
           </p:cNvPr>
@@ -3776,7 +3776,7 @@
         </p:nvSpPr>
         <p:spPr>
           <a:xfrm>
-            <a:off x="6291048" y="4282359"/>
+            <a:off x="6286416" y="3665603"/>
             <a:ext cx="3161508" cy="2118091"/>
           </a:xfrm>
           <a:prstGeom prst="roundRect">
@@ -3987,10 +3987,10 @@
       </p:sp>
       <p:sp>
         <p:nvSpPr>
-          <p:cNvPr id="27" name="Rectangle : coins arrondis 26">
-            <a:extLst>
-              <a:ext uri="{FF2B5EF4-FFF2-40B4-BE49-F238E27FC236}">
-                <a16:creationId xmlns:a16="http://schemas.microsoft.com/office/drawing/2014/main" id="{3F104D40-D615-47E2-81AF-8C75FA47C2DB}"/>
+          <p:cNvPr id="15" name="Rectangle : coins arrondis 14">
+            <a:extLst>
+              <a:ext uri="{FF2B5EF4-FFF2-40B4-BE49-F238E27FC236}">
+                <a16:creationId xmlns:a16="http://schemas.microsoft.com/office/drawing/2014/main" id="{C91ED5CA-8F22-465B-8E0D-765642A0C8C9}"/>
               </a:ext>
             </a:extLst>
           </p:cNvPr>
@@ -3999,7 +3999,7 @@
         </p:nvSpPr>
         <p:spPr>
           <a:xfrm>
-            <a:off x="6291048" y="1152835"/>
+            <a:off x="6286416" y="1900584"/>
             <a:ext cx="2074607" cy="668594"/>
           </a:xfrm>
           <a:prstGeom prst="roundRect">
@@ -4058,10 +4058,10 @@
       </p:sp>
       <p:sp>
         <p:nvSpPr>
-          <p:cNvPr id="34" name="Rectangle : coins arrondis 33">
-            <a:extLst>
-              <a:ext uri="{FF2B5EF4-FFF2-40B4-BE49-F238E27FC236}">
-                <a16:creationId xmlns:a16="http://schemas.microsoft.com/office/drawing/2014/main" id="{767D7B21-A30E-42F0-9BC8-8C7679578062}"/>
+          <p:cNvPr id="16" name="Rectangle : coins arrondis 15">
+            <a:extLst>
+              <a:ext uri="{FF2B5EF4-FFF2-40B4-BE49-F238E27FC236}">
+                <a16:creationId xmlns:a16="http://schemas.microsoft.com/office/drawing/2014/main" id="{694F658E-0C79-45C2-98AD-68B0E9F42A20}"/>
               </a:ext>
             </a:extLst>
           </p:cNvPr>
@@ -4070,7 +4070,7 @@
         </p:nvSpPr>
         <p:spPr>
           <a:xfrm>
-            <a:off x="9670295" y="5490010"/>
+            <a:off x="9630346" y="4873254"/>
             <a:ext cx="2320211" cy="910440"/>
           </a:xfrm>
           <a:prstGeom prst="roundRect">
@@ -4129,22 +4129,22 @@
       </p:sp>
       <p:cxnSp>
         <p:nvCxnSpPr>
-          <p:cNvPr id="35" name="Connecteur droit avec flèche 34">
-            <a:extLst>
-              <a:ext uri="{FF2B5EF4-FFF2-40B4-BE49-F238E27FC236}">
-                <a16:creationId xmlns:a16="http://schemas.microsoft.com/office/drawing/2014/main" id="{BF9DA26C-B11C-4C56-A399-229167D80D5C}"/>
+          <p:cNvPr id="17" name="Connecteur droit avec flèche 16">
+            <a:extLst>
+              <a:ext uri="{FF2B5EF4-FFF2-40B4-BE49-F238E27FC236}">
+                <a16:creationId xmlns:a16="http://schemas.microsoft.com/office/drawing/2014/main" id="{D5478B76-E714-4CF8-922A-083F8392B0B1}"/>
               </a:ext>
             </a:extLst>
           </p:cNvPr>
           <p:cNvCxnSpPr>
             <a:cxnSpLocks/>
-            <a:endCxn id="34" idx="1"/>
+            <a:endCxn id="16" idx="1"/>
           </p:cNvCxnSpPr>
           <p:nvPr/>
         </p:nvCxnSpPr>
         <p:spPr>
           <a:xfrm flipV="1">
-            <a:off x="9384528" y="5945230"/>
+            <a:off x="9344579" y="5328474"/>
             <a:ext cx="285767" cy="233262"/>
           </a:xfrm>
           <a:prstGeom prst="straightConnector1">
@@ -4174,23 +4174,23 @@
       </p:cxnSp>
       <p:cxnSp>
         <p:nvCxnSpPr>
-          <p:cNvPr id="36" name="Connecteur droit avec flèche 35">
-            <a:extLst>
-              <a:ext uri="{FF2B5EF4-FFF2-40B4-BE49-F238E27FC236}">
-                <a16:creationId xmlns:a16="http://schemas.microsoft.com/office/drawing/2014/main" id="{AD5D88D6-483F-45C4-BD6A-6523B0F5E0B2}"/>
+          <p:cNvPr id="18" name="Connecteur droit avec flèche 17">
+            <a:extLst>
+              <a:ext uri="{FF2B5EF4-FFF2-40B4-BE49-F238E27FC236}">
+                <a16:creationId xmlns:a16="http://schemas.microsoft.com/office/drawing/2014/main" id="{43478A0E-9408-4101-9CCC-3CD95D39F7B6}"/>
               </a:ext>
             </a:extLst>
           </p:cNvPr>
           <p:cNvCxnSpPr>
             <a:cxnSpLocks/>
-            <a:endCxn id="27" idx="1"/>
+            <a:endCxn id="15" idx="1"/>
           </p:cNvCxnSpPr>
           <p:nvPr/>
         </p:nvCxnSpPr>
         <p:spPr>
           <a:xfrm flipV="1">
-            <a:off x="5546035" y="1487132"/>
-            <a:ext cx="745013" cy="2691650"/>
+            <a:off x="5707055" y="2234881"/>
+            <a:ext cx="579361" cy="2105206"/>
           </a:xfrm>
           <a:prstGeom prst="straightConnector1">
             <a:avLst/>
@@ -4219,23 +4219,23 @@
       </p:cxnSp>
       <p:cxnSp>
         <p:nvCxnSpPr>
-          <p:cNvPr id="37" name="Connecteur droit avec flèche 36">
-            <a:extLst>
-              <a:ext uri="{FF2B5EF4-FFF2-40B4-BE49-F238E27FC236}">
-                <a16:creationId xmlns:a16="http://schemas.microsoft.com/office/drawing/2014/main" id="{837096D7-2BB3-4610-85B4-14C886BE1059}"/>
+          <p:cNvPr id="19" name="Connecteur droit avec flèche 18">
+            <a:extLst>
+              <a:ext uri="{FF2B5EF4-FFF2-40B4-BE49-F238E27FC236}">
+                <a16:creationId xmlns:a16="http://schemas.microsoft.com/office/drawing/2014/main" id="{6B8EC1E1-A6A7-41BA-BB4B-F33D810BE167}"/>
               </a:ext>
             </a:extLst>
           </p:cNvPr>
           <p:cNvCxnSpPr>
             <a:cxnSpLocks/>
-            <a:endCxn id="41" idx="1"/>
+            <a:endCxn id="22" idx="1"/>
           </p:cNvCxnSpPr>
           <p:nvPr/>
         </p:nvCxnSpPr>
         <p:spPr>
           <a:xfrm flipV="1">
-            <a:off x="5546035" y="3568332"/>
-            <a:ext cx="745013" cy="1618965"/>
+            <a:off x="5711687" y="3134990"/>
+            <a:ext cx="579361" cy="1920714"/>
           </a:xfrm>
           <a:prstGeom prst="straightConnector1">
             <a:avLst/>
@@ -4264,10 +4264,10 @@
       </p:cxnSp>
       <p:sp>
         <p:nvSpPr>
-          <p:cNvPr id="39" name="Rectangle : coins arrondis 38">
-            <a:extLst>
-              <a:ext uri="{FF2B5EF4-FFF2-40B4-BE49-F238E27FC236}">
-                <a16:creationId xmlns:a16="http://schemas.microsoft.com/office/drawing/2014/main" id="{14146D43-8BCB-452F-A62E-1621C035F5F0}"/>
+          <p:cNvPr id="20" name="Rectangle : coins arrondis 19">
+            <a:extLst>
+              <a:ext uri="{FF2B5EF4-FFF2-40B4-BE49-F238E27FC236}">
+                <a16:creationId xmlns:a16="http://schemas.microsoft.com/office/drawing/2014/main" id="{5F7F6191-7984-43F9-BA2A-4DDFBCE5B722}"/>
               </a:ext>
             </a:extLst>
           </p:cNvPr>
@@ -4276,8 +4276,8 @@
         </p:nvSpPr>
         <p:spPr>
           <a:xfrm>
-            <a:off x="2521705" y="833093"/>
-            <a:ext cx="3582289" cy="5554456"/>
+            <a:off x="2521705" y="654192"/>
+            <a:ext cx="3582289" cy="6024904"/>
           </a:xfrm>
           <a:prstGeom prst="roundRect">
             <a:avLst>
@@ -4549,7 +4549,7 @@
                   <a:srgbClr val="00B050"/>
                 </a:solidFill>
               </a:rPr>
-              <a:t>          exclusiveGroup 	 </a:t>
+              <a:t>          exclusiveGroup [	 </a:t>
             </a:r>
           </a:p>
           <a:p>
@@ -4560,7 +4560,7 @@
                   <a:srgbClr val="00B050"/>
                 </a:solidFill>
               </a:rPr>
-              <a:t>            [  { sampleRequirement }  ]</a:t>
+              <a:t>             { </a:t>
             </a:r>
           </a:p>
           <a:p>
@@ -4571,7 +4571,7 @@
                   <a:srgbClr val="00B050"/>
                 </a:solidFill>
               </a:rPr>
-              <a:t>    },</a:t>
+              <a:t>	     sampleRequirement  [] </a:t>
             </a:r>
           </a:p>
           <a:p>
@@ -4582,7 +4582,7 @@
                   <a:srgbClr val="00B050"/>
                 </a:solidFill>
               </a:rPr>
-              <a:t>    {</a:t>
+              <a:t>             }, </a:t>
             </a:r>
           </a:p>
           <a:p>
@@ -4593,7 +4593,7 @@
                   <a:srgbClr val="00B050"/>
                 </a:solidFill>
               </a:rPr>
-              <a:t>          exclusiveGroup 	 </a:t>
+              <a:t>             { </a:t>
             </a:r>
           </a:p>
           <a:p>
@@ -4604,7 +4604,7 @@
                   <a:srgbClr val="00B050"/>
                 </a:solidFill>
               </a:rPr>
-              <a:t>            [  { sampleRequirement }  ]</a:t>
+              <a:t>                  sampleRequirement  [] </a:t>
             </a:r>
           </a:p>
           <a:p>
@@ -4615,7 +4615,7 @@
                   <a:srgbClr val="00B050"/>
                 </a:solidFill>
               </a:rPr>
-              <a:t>     }</a:t>
+              <a:t>             }</a:t>
             </a:r>
           </a:p>
           <a:p>
@@ -4626,6 +4626,28 @@
                   <a:srgbClr val="00B050"/>
                 </a:solidFill>
               </a:rPr>
+              <a:t>         ]</a:t>
+            </a:r>
+          </a:p>
+          <a:p>
+            <a:pPr marL="354013"/>
+            <a:r>
+              <a:rPr lang="en-US" sz="1600" noProof="1">
+                <a:solidFill>
+                  <a:srgbClr val="00B050"/>
+                </a:solidFill>
+              </a:rPr>
+              <a:t>    }</a:t>
+            </a:r>
+          </a:p>
+          <a:p>
+            <a:pPr marL="354013"/>
+            <a:r>
+              <a:rPr lang="en-US" sz="1600" noProof="1">
+                <a:solidFill>
+                  <a:srgbClr val="00B050"/>
+                </a:solidFill>
+              </a:rPr>
               <a:t> ]</a:t>
             </a:r>
           </a:p>
@@ -4680,10 +4702,10 @@
       </p:sp>
       <p:sp>
         <p:nvSpPr>
-          <p:cNvPr id="40" name="ZoneTexte 39">
-            <a:extLst>
-              <a:ext uri="{FF2B5EF4-FFF2-40B4-BE49-F238E27FC236}">
-                <a16:creationId xmlns:a16="http://schemas.microsoft.com/office/drawing/2014/main" id="{F36194CC-CFE9-4D3C-B8D1-39191488EFDB}"/>
+          <p:cNvPr id="21" name="ZoneTexte 20">
+            <a:extLst>
+              <a:ext uri="{FF2B5EF4-FFF2-40B4-BE49-F238E27FC236}">
+                <a16:creationId xmlns:a16="http://schemas.microsoft.com/office/drawing/2014/main" id="{E86A3743-8449-4792-A35F-264EC3107E81}"/>
               </a:ext>
             </a:extLst>
           </p:cNvPr>
@@ -4692,7 +4714,7 @@
         </p:nvSpPr>
         <p:spPr>
           <a:xfrm>
-            <a:off x="112369" y="311440"/>
+            <a:off x="112369" y="112660"/>
             <a:ext cx="9703034" cy="461665"/>
           </a:xfrm>
           <a:prstGeom prst="rect">
@@ -4739,10 +4761,10 @@
       </p:sp>
       <p:sp>
         <p:nvSpPr>
-          <p:cNvPr id="41" name="Rectangle : coins arrondis 40">
-            <a:extLst>
-              <a:ext uri="{FF2B5EF4-FFF2-40B4-BE49-F238E27FC236}">
-                <a16:creationId xmlns:a16="http://schemas.microsoft.com/office/drawing/2014/main" id="{2660C42D-3703-4C11-AE84-5EE70EF88CD1}"/>
+          <p:cNvPr id="22" name="Rectangle : coins arrondis 21">
+            <a:extLst>
+              <a:ext uri="{FF2B5EF4-FFF2-40B4-BE49-F238E27FC236}">
+                <a16:creationId xmlns:a16="http://schemas.microsoft.com/office/drawing/2014/main" id="{F7C1A6D9-367E-408E-9AE2-03C53FCD790D}"/>
               </a:ext>
             </a:extLst>
           </p:cNvPr>
@@ -4751,7 +4773,7 @@
         </p:nvSpPr>
         <p:spPr>
           <a:xfrm>
-            <a:off x="6291048" y="3234035"/>
+            <a:off x="6291048" y="2800693"/>
             <a:ext cx="2074607" cy="668594"/>
           </a:xfrm>
           <a:prstGeom prst="roundRect">
@@ -4810,22 +4832,23 @@
       </p:sp>
       <p:cxnSp>
         <p:nvCxnSpPr>
-          <p:cNvPr id="42" name="Connecteur droit avec flèche 41">
-            <a:extLst>
-              <a:ext uri="{FF2B5EF4-FFF2-40B4-BE49-F238E27FC236}">
-                <a16:creationId xmlns:a16="http://schemas.microsoft.com/office/drawing/2014/main" id="{CBADE3BE-073C-4377-B439-F9B64BCE077A}"/>
+          <p:cNvPr id="24" name="Connecteur droit avec flèche 23">
+            <a:extLst>
+              <a:ext uri="{FF2B5EF4-FFF2-40B4-BE49-F238E27FC236}">
+                <a16:creationId xmlns:a16="http://schemas.microsoft.com/office/drawing/2014/main" id="{84742B45-67F4-4468-9654-34B017AE2E60}"/>
               </a:ext>
             </a:extLst>
           </p:cNvPr>
           <p:cNvCxnSpPr>
             <a:cxnSpLocks/>
+            <a:endCxn id="14" idx="1"/>
           </p:cNvCxnSpPr>
           <p:nvPr/>
         </p:nvCxnSpPr>
         <p:spPr>
           <a:xfrm flipV="1">
-            <a:off x="5135217" y="5463450"/>
-            <a:ext cx="1155831" cy="784950"/>
+            <a:off x="5064501" y="4724649"/>
+            <a:ext cx="1221915" cy="1832214"/>
           </a:xfrm>
           <a:prstGeom prst="straightConnector1">
             <a:avLst/>
@@ -4854,10 +4877,10 @@
       </p:cxnSp>
       <p:cxnSp>
         <p:nvCxnSpPr>
-          <p:cNvPr id="43" name="Connecteur droit avec flèche 42">
-            <a:extLst>
-              <a:ext uri="{FF2B5EF4-FFF2-40B4-BE49-F238E27FC236}">
-                <a16:creationId xmlns:a16="http://schemas.microsoft.com/office/drawing/2014/main" id="{640049E7-CDAE-412D-9B33-B69CAA70D467}"/>
+          <p:cNvPr id="25" name="Connecteur droit avec flèche 24">
+            <a:extLst>
+              <a:ext uri="{FF2B5EF4-FFF2-40B4-BE49-F238E27FC236}">
+                <a16:creationId xmlns:a16="http://schemas.microsoft.com/office/drawing/2014/main" id="{8E9BEB7A-2393-46AA-8FA6-A2AF50BACF6E}"/>
               </a:ext>
             </a:extLst>
           </p:cNvPr>
@@ -4868,7 +4891,7 @@
         </p:nvCxnSpPr>
         <p:spPr>
           <a:xfrm flipH="1">
-            <a:off x="2288748" y="1353202"/>
+            <a:off x="2288748" y="1174300"/>
             <a:ext cx="407799" cy="0"/>
           </a:xfrm>
           <a:prstGeom prst="straightConnector1">
@@ -4898,10 +4921,10 @@
       </p:cxnSp>
       <p:sp>
         <p:nvSpPr>
-          <p:cNvPr id="44" name="Rectangle : coins arrondis 43">
-            <a:extLst>
-              <a:ext uri="{FF2B5EF4-FFF2-40B4-BE49-F238E27FC236}">
-                <a16:creationId xmlns:a16="http://schemas.microsoft.com/office/drawing/2014/main" id="{DDE71F7A-89BA-48B8-9BC9-5C2C440512E7}"/>
+          <p:cNvPr id="26" name="Rectangle : coins arrondis 25">
+            <a:extLst>
+              <a:ext uri="{FF2B5EF4-FFF2-40B4-BE49-F238E27FC236}">
+                <a16:creationId xmlns:a16="http://schemas.microsoft.com/office/drawing/2014/main" id="{FB788CE5-0D2C-47F3-A102-F830065A52BA}"/>
               </a:ext>
             </a:extLst>
           </p:cNvPr>
@@ -4910,7 +4933,7 @@
         </p:nvSpPr>
         <p:spPr>
           <a:xfrm>
-            <a:off x="204073" y="833093"/>
+            <a:off x="204073" y="654191"/>
             <a:ext cx="2084675" cy="1613057"/>
           </a:xfrm>
           <a:prstGeom prst="roundRect">

</xml_diff>